<commit_message>
updated html and preso
</commit_message>
<xml_diff>
--- a/file-storage/Project Presentation.pptx
+++ b/file-storage/Project Presentation.pptx
@@ -245,6 +245,11 @@
       </a:defRPr>
     </a:lvl9pPr>
   </p:defaultTextStyle>
+  <p:extLst>
+    <p:ext uri="{EFAFB233-063F-42B5-8137-9DF3F51BA10A}">
+      <p15:sldGuideLst xmlns:p15="http://schemas.microsoft.com/office/powerpoint/2012/main"/>
+    </p:ext>
+  </p:extLst>
 </p:presentation>
 </file>
 
@@ -6186,6 +6191,19 @@
             </a:r>
           </a:p>
           <a:p>
+            <a:pPr marL="114300" indent="0">
+              <a:buClr>
+                <a:schemeClr val="bg1"/>
+              </a:buClr>
+              <a:buNone/>
+            </a:pPr>
+            <a:endParaRPr lang="en" sz="1400" dirty="0">
+              <a:solidFill>
+                <a:schemeClr val="bg1"/>
+              </a:solidFill>
+            </a:endParaRPr>
+          </a:p>
+          <a:p>
             <a:pPr marL="457200" lvl="0" indent="-342900" algn="l" rtl="0">
               <a:spcBef>
                 <a:spcPts val="0"/>
@@ -6239,6 +6257,26 @@
               </a:rPr>
               <a:t> and CS</a:t>
             </a:r>
+          </a:p>
+          <a:p>
+            <a:pPr marL="457200" lvl="0" indent="-342900" algn="l" rtl="0">
+              <a:spcBef>
+                <a:spcPts val="0"/>
+              </a:spcBef>
+              <a:spcAft>
+                <a:spcPts val="0"/>
+              </a:spcAft>
+              <a:buClr>
+                <a:schemeClr val="bg1"/>
+              </a:buClr>
+              <a:buSzPts val="1800"/>
+              <a:buChar char="●"/>
+            </a:pPr>
+            <a:endParaRPr lang="en-US" sz="1400" dirty="0">
+              <a:solidFill>
+                <a:schemeClr val="bg1"/>
+              </a:solidFill>
+            </a:endParaRPr>
           </a:p>
           <a:p>
             <a:pPr marL="457200" lvl="0" indent="-342900" algn="l" rtl="0">
@@ -6495,20 +6533,12 @@
               </a:rPr>
               <a:t>Breakdown of tasks and roles</a:t>
             </a:r>
-            <a:endParaRPr dirty="0">
-              <a:solidFill>
-                <a:schemeClr val="bg1"/>
-              </a:solidFill>
-            </a:endParaRPr>
-          </a:p>
-          <a:p>
-            <a:pPr marL="457200" lvl="0" indent="-342900" algn="l" rtl="0">
-              <a:spcBef>
-                <a:spcPts val="0"/>
-              </a:spcBef>
-              <a:spcAft>
-                <a:spcPts val="0"/>
-              </a:spcAft>
+          </a:p>
+          <a:p>
+            <a:pPr lvl="1" indent="-342900">
+              <a:spcBef>
+                <a:spcPts val="0"/>
+              </a:spcBef>
               <a:buClr>
                 <a:schemeClr val="bg1"/>
               </a:buClr>
@@ -6521,8 +6551,125 @@
                   <a:schemeClr val="bg1"/>
                 </a:solidFill>
               </a:rPr>
-              <a:t>Search History, Debugging, Modal, Javascript, Applying CSS, </a:t>
+              <a:t>Search History</a:t>
             </a:r>
+          </a:p>
+          <a:p>
+            <a:pPr lvl="1" indent="-342900">
+              <a:spcBef>
+                <a:spcPts val="0"/>
+              </a:spcBef>
+              <a:buClr>
+                <a:schemeClr val="bg1"/>
+              </a:buClr>
+              <a:buSzPts val="1800"/>
+              <a:buChar char="●"/>
+            </a:pPr>
+            <a:r>
+              <a:rPr lang="en" dirty="0">
+                <a:solidFill>
+                  <a:schemeClr val="bg1"/>
+                </a:solidFill>
+              </a:rPr>
+              <a:t> Debugging,</a:t>
+            </a:r>
+          </a:p>
+          <a:p>
+            <a:pPr lvl="1" indent="-342900">
+              <a:spcBef>
+                <a:spcPts val="0"/>
+              </a:spcBef>
+              <a:buClr>
+                <a:schemeClr val="bg1"/>
+              </a:buClr>
+              <a:buSzPts val="1800"/>
+              <a:buChar char="●"/>
+            </a:pPr>
+            <a:r>
+              <a:rPr lang="en" dirty="0">
+                <a:solidFill>
+                  <a:schemeClr val="bg1"/>
+                </a:solidFill>
+              </a:rPr>
+              <a:t>Modals, </a:t>
+            </a:r>
+          </a:p>
+          <a:p>
+            <a:pPr lvl="1" indent="-342900">
+              <a:spcBef>
+                <a:spcPts val="0"/>
+              </a:spcBef>
+              <a:buClr>
+                <a:schemeClr val="bg1"/>
+              </a:buClr>
+              <a:buSzPts val="1800"/>
+              <a:buChar char="●"/>
+            </a:pPr>
+            <a:r>
+              <a:rPr lang="en" dirty="0">
+                <a:solidFill>
+                  <a:schemeClr val="bg1"/>
+                </a:solidFill>
+              </a:rPr>
+              <a:t>Javascript, </a:t>
+            </a:r>
+          </a:p>
+          <a:p>
+            <a:pPr lvl="1" indent="-342900">
+              <a:spcBef>
+                <a:spcPts val="0"/>
+              </a:spcBef>
+              <a:buClr>
+                <a:schemeClr val="bg1"/>
+              </a:buClr>
+              <a:buSzPts val="1800"/>
+              <a:buChar char="●"/>
+            </a:pPr>
+            <a:r>
+              <a:rPr lang="en" dirty="0">
+                <a:solidFill>
+                  <a:schemeClr val="bg1"/>
+                </a:solidFill>
+              </a:rPr>
+              <a:t>Applying CSS,</a:t>
+            </a:r>
+          </a:p>
+          <a:p>
+            <a:pPr lvl="1" indent="-342900">
+              <a:spcBef>
+                <a:spcPts val="0"/>
+              </a:spcBef>
+              <a:buClr>
+                <a:schemeClr val="bg1"/>
+              </a:buClr>
+              <a:buSzPts val="1800"/>
+              <a:buChar char="●"/>
+            </a:pPr>
+            <a:r>
+              <a:rPr lang="en" dirty="0">
+                <a:solidFill>
+                  <a:schemeClr val="bg1"/>
+                </a:solidFill>
+              </a:rPr>
+              <a:t>Readme</a:t>
+            </a:r>
+          </a:p>
+          <a:p>
+            <a:pPr marL="571500" lvl="1" indent="0">
+              <a:spcBef>
+                <a:spcPts val="0"/>
+              </a:spcBef>
+              <a:buClr>
+                <a:schemeClr val="bg1"/>
+              </a:buClr>
+              <a:buSzPts val="1800"/>
+              <a:buNone/>
+            </a:pPr>
+            <a:endParaRPr lang="en" dirty="0">
+              <a:solidFill>
+                <a:schemeClr val="bg1"/>
+              </a:solidFill>
+            </a:endParaRPr>
           </a:p>
           <a:p>
             <a:pPr marL="457200" lvl="0" indent="-342900" algn="l" rtl="0">
@@ -6546,66 +6693,6 @@
               </a:rPr>
               <a:t>Project lead, Developers</a:t>
             </a:r>
-          </a:p>
-          <a:p>
-            <a:pPr marL="114300" lvl="0" indent="0" algn="l" rtl="0">
-              <a:spcBef>
-                <a:spcPts val="0"/>
-              </a:spcBef>
-              <a:spcAft>
-                <a:spcPts val="0"/>
-              </a:spcAft>
-              <a:buClr>
-                <a:schemeClr val="bg1"/>
-              </a:buClr>
-              <a:buSzPts val="1800"/>
-              <a:buNone/>
-            </a:pPr>
-            <a:endParaRPr lang="en" dirty="0">
-              <a:solidFill>
-                <a:schemeClr val="bg1"/>
-              </a:solidFill>
-            </a:endParaRPr>
-          </a:p>
-          <a:p>
-            <a:pPr marL="114300" lvl="0" indent="0" algn="l" rtl="0">
-              <a:spcBef>
-                <a:spcPts val="0"/>
-              </a:spcBef>
-              <a:spcAft>
-                <a:spcPts val="0"/>
-              </a:spcAft>
-              <a:buClr>
-                <a:schemeClr val="bg1"/>
-              </a:buClr>
-              <a:buSzPts val="1800"/>
-              <a:buNone/>
-            </a:pPr>
-            <a:endParaRPr lang="en" dirty="0">
-              <a:solidFill>
-                <a:schemeClr val="bg1"/>
-              </a:solidFill>
-            </a:endParaRPr>
-          </a:p>
-          <a:p>
-            <a:pPr marL="114300" lvl="0" indent="0" algn="l" rtl="0">
-              <a:spcBef>
-                <a:spcPts val="0"/>
-              </a:spcBef>
-              <a:spcAft>
-                <a:spcPts val="0"/>
-              </a:spcAft>
-              <a:buClr>
-                <a:schemeClr val="bg1"/>
-              </a:buClr>
-              <a:buSzPts val="1800"/>
-              <a:buNone/>
-            </a:pPr>
-            <a:endParaRPr lang="en" dirty="0">
-              <a:solidFill>
-                <a:schemeClr val="bg1"/>
-              </a:solidFill>
-            </a:endParaRPr>
           </a:p>
           <a:p>
             <a:pPr marL="114300" lvl="0" indent="0" algn="l" rtl="0">

</xml_diff>

<commit_message>
created about.html and updated presentation
</commit_message>
<xml_diff>
--- a/file-storage/Project Presentation.pptx
+++ b/file-storage/Project Presentation.pptx
@@ -5,14 +5,16 @@
     <p:sldMasterId id="2147483659" r:id="rId1"/>
   </p:sldMasterIdLst>
   <p:notesMasterIdLst>
-    <p:notesMasterId r:id="rId7"/>
+    <p:notesMasterId r:id="rId9"/>
   </p:notesMasterIdLst>
   <p:sldIdLst>
     <p:sldId id="256" r:id="rId2"/>
-    <p:sldId id="258" r:id="rId3"/>
-    <p:sldId id="259" r:id="rId4"/>
-    <p:sldId id="260" r:id="rId5"/>
-    <p:sldId id="262" r:id="rId6"/>
+    <p:sldId id="263" r:id="rId3"/>
+    <p:sldId id="258" r:id="rId4"/>
+    <p:sldId id="259" r:id="rId5"/>
+    <p:sldId id="260" r:id="rId6"/>
+    <p:sldId id="264" r:id="rId7"/>
+    <p:sldId id="262" r:id="rId8"/>
   </p:sldIdLst>
   <p:sldSz cx="9144000" cy="5143500" type="screen16x9"/>
   <p:notesSz cx="6858000" cy="9144000"/>
@@ -803,6 +805,115 @@
   <p:cSld>
     <p:spTree>
       <p:nvGrpSpPr>
+        <p:cNvPr id="1" name="Shape 73"/>
+        <p:cNvGrpSpPr/>
+        <p:nvPr/>
+      </p:nvGrpSpPr>
+      <p:grpSpPr>
+        <a:xfrm>
+          <a:off x="0" y="0"/>
+          <a:ext cx="0" cy="0"/>
+          <a:chOff x="0" y="0"/>
+          <a:chExt cx="0" cy="0"/>
+        </a:xfrm>
+      </p:grpSpPr>
+      <p:sp>
+        <p:nvSpPr>
+          <p:cNvPr id="74" name="Google Shape;74;g29f43f0a72_0_15:notes"/>
+          <p:cNvSpPr>
+            <a:spLocks noGrp="1" noRot="1" noChangeAspect="1"/>
+          </p:cNvSpPr>
+          <p:nvPr>
+            <p:ph type="sldImg" idx="2"/>
+          </p:nvPr>
+        </p:nvSpPr>
+        <p:spPr>
+          <a:xfrm>
+            <a:off x="381000" y="685800"/>
+            <a:ext cx="6096000" cy="3429000"/>
+          </a:xfrm>
+          <a:custGeom>
+            <a:avLst/>
+            <a:gdLst/>
+            <a:ahLst/>
+            <a:cxnLst/>
+            <a:rect l="l" t="t" r="r" b="b"/>
+            <a:pathLst>
+              <a:path w="120000" h="120000" extrusionOk="0">
+                <a:moveTo>
+                  <a:pt x="0" y="0"/>
+                </a:moveTo>
+                <a:lnTo>
+                  <a:pt x="120000" y="0"/>
+                </a:lnTo>
+                <a:lnTo>
+                  <a:pt x="120000" y="120000"/>
+                </a:lnTo>
+                <a:lnTo>
+                  <a:pt x="0" y="120000"/>
+                </a:lnTo>
+                <a:close/>
+              </a:path>
+            </a:pathLst>
+          </a:custGeom>
+        </p:spPr>
+      </p:sp>
+      <p:sp>
+        <p:nvSpPr>
+          <p:cNvPr id="75" name="Google Shape;75;g29f43f0a72_0_15:notes"/>
+          <p:cNvSpPr txBox="1">
+            <a:spLocks noGrp="1"/>
+          </p:cNvSpPr>
+          <p:nvPr>
+            <p:ph type="body" idx="1"/>
+          </p:nvPr>
+        </p:nvSpPr>
+        <p:spPr>
+          <a:xfrm>
+            <a:off x="685800" y="4343400"/>
+            <a:ext cx="5486400" cy="4114800"/>
+          </a:xfrm>
+          <a:prstGeom prst="rect">
+            <a:avLst/>
+          </a:prstGeom>
+        </p:spPr>
+        <p:txBody>
+          <a:bodyPr spcFirstLastPara="1" wrap="square" lIns="91425" tIns="91425" rIns="91425" bIns="91425" anchor="t" anchorCtr="0">
+            <a:noAutofit/>
+          </a:bodyPr>
+          <a:lstStyle/>
+          <a:p>
+            <a:pPr marL="0" lvl="0" indent="0" algn="l" rtl="0">
+              <a:spcBef>
+                <a:spcPts val="0"/>
+              </a:spcBef>
+              <a:spcAft>
+                <a:spcPts val="0"/>
+              </a:spcAft>
+              <a:buNone/>
+            </a:pPr>
+            <a:endParaRPr/>
+          </a:p>
+        </p:txBody>
+      </p:sp>
+    </p:spTree>
+    <p:extLst>
+      <p:ext uri="{BB962C8B-B14F-4D97-AF65-F5344CB8AC3E}">
+        <p14:creationId xmlns:p14="http://schemas.microsoft.com/office/powerpoint/2010/main" val="744910810"/>
+      </p:ext>
+    </p:extLst>
+  </p:cSld>
+  <p:clrMapOvr>
+    <a:masterClrMapping/>
+  </p:clrMapOvr>
+</p:notes>
+</file>
+
+<file path=ppt/notesSlides/notesSlide3.xml><?xml version="1.0" encoding="utf-8"?>
+<p:notes xmlns:a="http://schemas.openxmlformats.org/drawingml/2006/main" xmlns:r="http://schemas.openxmlformats.org/officeDocument/2006/relationships" xmlns:p="http://schemas.openxmlformats.org/presentationml/2006/main" showMasterSp="0" showMasterPhAnim="0">
+  <p:cSld>
+    <p:spTree>
+      <p:nvGrpSpPr>
         <p:cNvPr id="1" name="Shape 61"/>
         <p:cNvGrpSpPr/>
         <p:nvPr/>
@@ -902,7 +1013,7 @@
 </p:notes>
 </file>
 
-<file path=ppt/notesSlides/notesSlide3.xml><?xml version="1.0" encoding="utf-8"?>
+<file path=ppt/notesSlides/notesSlide4.xml><?xml version="1.0" encoding="utf-8"?>
 <p:notes xmlns:a="http://schemas.openxmlformats.org/drawingml/2006/main" xmlns:r="http://schemas.openxmlformats.org/officeDocument/2006/relationships" xmlns:p="http://schemas.openxmlformats.org/presentationml/2006/main" showMasterSp="0" showMasterPhAnim="0">
   <p:cSld>
     <p:spTree>
@@ -1006,7 +1117,7 @@
 </p:notes>
 </file>
 
-<file path=ppt/notesSlides/notesSlide4.xml><?xml version="1.0" encoding="utf-8"?>
+<file path=ppt/notesSlides/notesSlide5.xml><?xml version="1.0" encoding="utf-8"?>
 <p:notes xmlns:a="http://schemas.openxmlformats.org/drawingml/2006/main" xmlns:r="http://schemas.openxmlformats.org/officeDocument/2006/relationships" xmlns:p="http://schemas.openxmlformats.org/presentationml/2006/main" showMasterSp="0" showMasterPhAnim="0">
   <p:cSld>
     <p:spTree>
@@ -1110,7 +1221,116 @@
 </p:notes>
 </file>
 
-<file path=ppt/notesSlides/notesSlide5.xml><?xml version="1.0" encoding="utf-8"?>
+<file path=ppt/notesSlides/notesSlide6.xml><?xml version="1.0" encoding="utf-8"?>
+<p:notes xmlns:a="http://schemas.openxmlformats.org/drawingml/2006/main" xmlns:r="http://schemas.openxmlformats.org/officeDocument/2006/relationships" xmlns:p="http://schemas.openxmlformats.org/presentationml/2006/main" showMasterSp="0" showMasterPhAnim="0">
+  <p:cSld>
+    <p:spTree>
+      <p:nvGrpSpPr>
+        <p:cNvPr id="1" name="Shape 73"/>
+        <p:cNvGrpSpPr/>
+        <p:nvPr/>
+      </p:nvGrpSpPr>
+      <p:grpSpPr>
+        <a:xfrm>
+          <a:off x="0" y="0"/>
+          <a:ext cx="0" cy="0"/>
+          <a:chOff x="0" y="0"/>
+          <a:chExt cx="0" cy="0"/>
+        </a:xfrm>
+      </p:grpSpPr>
+      <p:sp>
+        <p:nvSpPr>
+          <p:cNvPr id="74" name="Google Shape;74;g29f43f0a72_0_15:notes"/>
+          <p:cNvSpPr>
+            <a:spLocks noGrp="1" noRot="1" noChangeAspect="1"/>
+          </p:cNvSpPr>
+          <p:nvPr>
+            <p:ph type="sldImg" idx="2"/>
+          </p:nvPr>
+        </p:nvSpPr>
+        <p:spPr>
+          <a:xfrm>
+            <a:off x="381000" y="685800"/>
+            <a:ext cx="6096000" cy="3429000"/>
+          </a:xfrm>
+          <a:custGeom>
+            <a:avLst/>
+            <a:gdLst/>
+            <a:ahLst/>
+            <a:cxnLst/>
+            <a:rect l="l" t="t" r="r" b="b"/>
+            <a:pathLst>
+              <a:path w="120000" h="120000" extrusionOk="0">
+                <a:moveTo>
+                  <a:pt x="0" y="0"/>
+                </a:moveTo>
+                <a:lnTo>
+                  <a:pt x="120000" y="0"/>
+                </a:lnTo>
+                <a:lnTo>
+                  <a:pt x="120000" y="120000"/>
+                </a:lnTo>
+                <a:lnTo>
+                  <a:pt x="0" y="120000"/>
+                </a:lnTo>
+                <a:close/>
+              </a:path>
+            </a:pathLst>
+          </a:custGeom>
+        </p:spPr>
+      </p:sp>
+      <p:sp>
+        <p:nvSpPr>
+          <p:cNvPr id="75" name="Google Shape;75;g29f43f0a72_0_15:notes"/>
+          <p:cNvSpPr txBox="1">
+            <a:spLocks noGrp="1"/>
+          </p:cNvSpPr>
+          <p:nvPr>
+            <p:ph type="body" idx="1"/>
+          </p:nvPr>
+        </p:nvSpPr>
+        <p:spPr>
+          <a:xfrm>
+            <a:off x="685800" y="4343400"/>
+            <a:ext cx="5486400" cy="4114800"/>
+          </a:xfrm>
+          <a:prstGeom prst="rect">
+            <a:avLst/>
+          </a:prstGeom>
+        </p:spPr>
+        <p:txBody>
+          <a:bodyPr spcFirstLastPara="1" wrap="square" lIns="91425" tIns="91425" rIns="91425" bIns="91425" anchor="t" anchorCtr="0">
+            <a:noAutofit/>
+          </a:bodyPr>
+          <a:lstStyle/>
+          <a:p>
+            <a:pPr marL="0" lvl="0" indent="0" algn="l" rtl="0">
+              <a:spcBef>
+                <a:spcPts val="0"/>
+              </a:spcBef>
+              <a:spcAft>
+                <a:spcPts val="0"/>
+              </a:spcAft>
+              <a:buNone/>
+            </a:pPr>
+            <a:endParaRPr/>
+          </a:p>
+        </p:txBody>
+      </p:sp>
+    </p:spTree>
+    <p:extLst>
+      <p:ext uri="{BB962C8B-B14F-4D97-AF65-F5344CB8AC3E}">
+        <p14:creationId xmlns:p14="http://schemas.microsoft.com/office/powerpoint/2010/main" val="2376312444"/>
+      </p:ext>
+    </p:extLst>
+  </p:cSld>
+  <p:clrMapOvr>
+    <a:masterClrMapping/>
+  </p:clrMapOvr>
+</p:notes>
+</file>
+
+<file path=ppt/notesSlides/notesSlide7.xml><?xml version="1.0" encoding="utf-8"?>
 <p:notes xmlns:a="http://schemas.openxmlformats.org/drawingml/2006/main" xmlns:r="http://schemas.openxmlformats.org/officeDocument/2006/relationships" xmlns:p="http://schemas.openxmlformats.org/presentationml/2006/main" showMasterSp="0" showMasterPhAnim="0">
   <p:cSld>
     <p:spTree>
@@ -6089,6 +6309,306 @@
     </p:bg>
     <p:spTree>
       <p:nvGrpSpPr>
+        <p:cNvPr id="1" name="Shape 76"/>
+        <p:cNvGrpSpPr/>
+        <p:nvPr/>
+      </p:nvGrpSpPr>
+      <p:grpSpPr>
+        <a:xfrm>
+          <a:off x="0" y="0"/>
+          <a:ext cx="0" cy="0"/>
+          <a:chOff x="0" y="0"/>
+          <a:chExt cx="0" cy="0"/>
+        </a:xfrm>
+      </p:grpSpPr>
+      <p:sp>
+        <p:nvSpPr>
+          <p:cNvPr id="77" name="Google Shape;77;p17"/>
+          <p:cNvSpPr txBox="1">
+            <a:spLocks noGrp="1"/>
+          </p:cNvSpPr>
+          <p:nvPr>
+            <p:ph type="title"/>
+          </p:nvPr>
+        </p:nvSpPr>
+        <p:spPr>
+          <a:xfrm>
+            <a:off x="0" y="0"/>
+            <a:ext cx="9144000" cy="914468"/>
+          </a:xfrm>
+          <a:prstGeom prst="rect">
+            <a:avLst/>
+          </a:prstGeom>
+        </p:spPr>
+        <p:txBody>
+          <a:bodyPr spcFirstLastPara="1" wrap="square" lIns="91425" tIns="91425" rIns="91425" bIns="91425" anchor="ctr" anchorCtr="0">
+            <a:noAutofit/>
+          </a:bodyPr>
+          <a:lstStyle/>
+          <a:p>
+            <a:pPr marL="0" lvl="0" indent="0" algn="ctr" rtl="0">
+              <a:spcBef>
+                <a:spcPts val="0"/>
+              </a:spcBef>
+              <a:spcAft>
+                <a:spcPts val="0"/>
+              </a:spcAft>
+              <a:buNone/>
+            </a:pPr>
+            <a:r>
+              <a:rPr lang="en" dirty="0">
+                <a:solidFill>
+                  <a:schemeClr val="bg1"/>
+                </a:solidFill>
+              </a:rPr>
+              <a:t>Pitch</a:t>
+            </a:r>
+            <a:endParaRPr dirty="0">
+              <a:solidFill>
+                <a:schemeClr val="bg1"/>
+              </a:solidFill>
+            </a:endParaRPr>
+          </a:p>
+        </p:txBody>
+      </p:sp>
+      <p:sp>
+        <p:nvSpPr>
+          <p:cNvPr id="4" name="TextBox 3">
+            <a:extLst>
+              <a:ext uri="{FF2B5EF4-FFF2-40B4-BE49-F238E27FC236}">
+                <a16:creationId xmlns:a16="http://schemas.microsoft.com/office/drawing/2014/main" id="{0DE304EC-4236-E324-15BE-7835C5FBCF25}"/>
+              </a:ext>
+            </a:extLst>
+          </p:cNvPr>
+          <p:cNvSpPr txBox="1"/>
+          <p:nvPr/>
+        </p:nvSpPr>
+        <p:spPr>
+          <a:xfrm>
+            <a:off x="-235527" y="1440870"/>
+            <a:ext cx="8804564" cy="540259"/>
+          </a:xfrm>
+          <a:prstGeom prst="rect">
+            <a:avLst/>
+          </a:prstGeom>
+          <a:noFill/>
+        </p:spPr>
+        <p:txBody>
+          <a:bodyPr wrap="square">
+            <a:spAutoFit/>
+          </a:bodyPr>
+          <a:lstStyle/>
+          <a:p>
+            <a:pPr marL="114300" lvl="0" algn="ctr" rtl="0">
+              <a:spcBef>
+                <a:spcPts val="0"/>
+              </a:spcBef>
+              <a:spcAft>
+                <a:spcPts val="0"/>
+              </a:spcAft>
+              <a:buClr>
+                <a:schemeClr val="bg1"/>
+              </a:buClr>
+              <a:buSzPts val="1800"/>
+            </a:pPr>
+            <a:endParaRPr lang="en-US" dirty="0">
+              <a:solidFill>
+                <a:schemeClr val="bg1"/>
+              </a:solidFill>
+            </a:endParaRPr>
+          </a:p>
+          <a:p>
+            <a:pPr marL="114300" lvl="0" algn="ctr" rtl="0">
+              <a:spcBef>
+                <a:spcPts val="0"/>
+              </a:spcBef>
+              <a:spcAft>
+                <a:spcPts val="0"/>
+              </a:spcAft>
+              <a:buClr>
+                <a:schemeClr val="bg1"/>
+              </a:buClr>
+              <a:buSzPts val="1800"/>
+            </a:pPr>
+            <a:r>
+              <a:rPr lang="en-US" dirty="0">
+                <a:solidFill>
+                  <a:schemeClr val="bg1"/>
+                </a:solidFill>
+              </a:rPr>
+              <a:t>Have you ever been to a movie and thought this soundtrack is amazing, but I wish I knew how to find it? </a:t>
+            </a:r>
+          </a:p>
+        </p:txBody>
+      </p:sp>
+      <p:sp>
+        <p:nvSpPr>
+          <p:cNvPr id="5" name="TextBox 4">
+            <a:extLst>
+              <a:ext uri="{FF2B5EF4-FFF2-40B4-BE49-F238E27FC236}">
+                <a16:creationId xmlns:a16="http://schemas.microsoft.com/office/drawing/2014/main" id="{8FC3E00E-687E-A3C1-813F-CA008D7246A8}"/>
+              </a:ext>
+            </a:extLst>
+          </p:cNvPr>
+          <p:cNvSpPr txBox="1"/>
+          <p:nvPr/>
+        </p:nvSpPr>
+        <p:spPr>
+          <a:xfrm>
+            <a:off x="-110836" y="2433237"/>
+            <a:ext cx="8804564" cy="540259"/>
+          </a:xfrm>
+          <a:prstGeom prst="rect">
+            <a:avLst/>
+          </a:prstGeom>
+          <a:noFill/>
+        </p:spPr>
+        <p:txBody>
+          <a:bodyPr wrap="square">
+            <a:spAutoFit/>
+          </a:bodyPr>
+          <a:lstStyle/>
+          <a:p>
+            <a:pPr marL="114300" lvl="0" algn="ctr" rtl="0">
+              <a:spcBef>
+                <a:spcPts val="0"/>
+              </a:spcBef>
+              <a:spcAft>
+                <a:spcPts val="0"/>
+              </a:spcAft>
+              <a:buClr>
+                <a:schemeClr val="bg1"/>
+              </a:buClr>
+              <a:buSzPts val="1800"/>
+            </a:pPr>
+            <a:r>
+              <a:rPr lang="en-US" dirty="0">
+                <a:solidFill>
+                  <a:schemeClr val="bg1"/>
+                </a:solidFill>
+              </a:rPr>
+              <a:t>A lot of movie databases only give you information about the movie but not the music</a:t>
+            </a:r>
+          </a:p>
+          <a:p>
+            <a:pPr marL="457200" lvl="0" indent="-342900" algn="ctr" rtl="0">
+              <a:spcBef>
+                <a:spcPts val="0"/>
+              </a:spcBef>
+              <a:spcAft>
+                <a:spcPts val="0"/>
+              </a:spcAft>
+              <a:buClr>
+                <a:schemeClr val="bg1"/>
+              </a:buClr>
+              <a:buSzPts val="1800"/>
+              <a:buChar char="●"/>
+            </a:pPr>
+            <a:endParaRPr lang="en-US" dirty="0">
+              <a:solidFill>
+                <a:schemeClr val="bg1"/>
+              </a:solidFill>
+            </a:endParaRPr>
+          </a:p>
+        </p:txBody>
+      </p:sp>
+      <p:sp>
+        <p:nvSpPr>
+          <p:cNvPr id="6" name="TextBox 5">
+            <a:extLst>
+              <a:ext uri="{FF2B5EF4-FFF2-40B4-BE49-F238E27FC236}">
+                <a16:creationId xmlns:a16="http://schemas.microsoft.com/office/drawing/2014/main" id="{7CE5EAF2-0DC6-5EDA-5084-1CDF98223B98}"/>
+              </a:ext>
+            </a:extLst>
+          </p:cNvPr>
+          <p:cNvSpPr txBox="1"/>
+          <p:nvPr/>
+        </p:nvSpPr>
+        <p:spPr>
+          <a:xfrm>
+            <a:off x="-235527" y="3229768"/>
+            <a:ext cx="8804564" cy="540259"/>
+          </a:xfrm>
+          <a:prstGeom prst="rect">
+            <a:avLst/>
+          </a:prstGeom>
+          <a:noFill/>
+        </p:spPr>
+        <p:txBody>
+          <a:bodyPr wrap="square">
+            <a:spAutoFit/>
+          </a:bodyPr>
+          <a:lstStyle/>
+          <a:p>
+            <a:pPr marL="114300" lvl="0" algn="ctr" rtl="0">
+              <a:spcBef>
+                <a:spcPts val="0"/>
+              </a:spcBef>
+              <a:spcAft>
+                <a:spcPts val="0"/>
+              </a:spcAft>
+              <a:buClr>
+                <a:schemeClr val="bg1"/>
+              </a:buClr>
+              <a:buSzPts val="1800"/>
+            </a:pPr>
+            <a:r>
+              <a:rPr lang="en-US" dirty="0">
+                <a:solidFill>
+                  <a:schemeClr val="bg1"/>
+                </a:solidFill>
+              </a:rPr>
+              <a:t>Our database provides a link between the Movie and the Soundtrack</a:t>
+            </a:r>
+          </a:p>
+          <a:p>
+            <a:pPr marL="457200" lvl="0" indent="-342900" algn="ctr" rtl="0">
+              <a:spcBef>
+                <a:spcPts val="0"/>
+              </a:spcBef>
+              <a:spcAft>
+                <a:spcPts val="0"/>
+              </a:spcAft>
+              <a:buClr>
+                <a:schemeClr val="bg1"/>
+              </a:buClr>
+              <a:buSzPts val="1800"/>
+              <a:buChar char="●"/>
+            </a:pPr>
+            <a:endParaRPr lang="en-US" dirty="0">
+              <a:solidFill>
+                <a:schemeClr val="bg1"/>
+              </a:solidFill>
+            </a:endParaRPr>
+          </a:p>
+        </p:txBody>
+      </p:sp>
+    </p:spTree>
+    <p:extLst>
+      <p:ext uri="{BB962C8B-B14F-4D97-AF65-F5344CB8AC3E}">
+        <p14:creationId xmlns:p14="http://schemas.microsoft.com/office/powerpoint/2010/main" val="4126071248"/>
+      </p:ext>
+    </p:extLst>
+  </p:cSld>
+  <p:clrMapOvr>
+    <a:masterClrMapping/>
+  </p:clrMapOvr>
+</p:sld>
+</file>
+
+<file path=ppt/slides/slide3.xml><?xml version="1.0" encoding="utf-8"?>
+<p:sld xmlns:a="http://schemas.openxmlformats.org/drawingml/2006/main" xmlns:r="http://schemas.openxmlformats.org/officeDocument/2006/relationships" xmlns:p="http://schemas.openxmlformats.org/presentationml/2006/main">
+  <p:cSld>
+    <p:bg>
+      <p:bgPr>
+        <a:solidFill>
+          <a:srgbClr val="4B0082"/>
+        </a:solidFill>
+        <a:effectLst/>
+      </p:bgPr>
+    </p:bg>
+    <p:spTree>
+      <p:nvGrpSpPr>
         <p:cNvPr id="1" name="Shape 64"/>
         <p:cNvGrpSpPr/>
         <p:nvPr/>
@@ -6364,7 +6884,7 @@
 </p:sld>
 </file>
 
-<file path=ppt/slides/slide3.xml><?xml version="1.0" encoding="utf-8"?>
+<file path=ppt/slides/slide4.xml><?xml version="1.0" encoding="utf-8"?>
 <p:sld xmlns:a="http://schemas.openxmlformats.org/drawingml/2006/main" xmlns:r="http://schemas.openxmlformats.org/officeDocument/2006/relationships" xmlns:p="http://schemas.openxmlformats.org/presentationml/2006/main">
   <p:cSld>
     <p:bg>
@@ -6571,7 +7091,7 @@
                   <a:schemeClr val="bg1"/>
                 </a:solidFill>
               </a:rPr>
-              <a:t> Debugging,</a:t>
+              <a:t>Debugging,</a:t>
             </a:r>
           </a:p>
           <a:p>
@@ -7012,7 +7532,7 @@
 </p:sld>
 </file>
 
-<file path=ppt/slides/slide4.xml><?xml version="1.0" encoding="utf-8"?>
+<file path=ppt/slides/slide5.xml><?xml version="1.0" encoding="utf-8"?>
 <p:sld xmlns:a="http://schemas.openxmlformats.org/drawingml/2006/main" xmlns:r="http://schemas.openxmlformats.org/officeDocument/2006/relationships" xmlns:p="http://schemas.openxmlformats.org/presentationml/2006/main">
   <p:cSld>
     <p:bg>
@@ -7087,7 +7607,205 @@
 </p:sld>
 </file>
 
-<file path=ppt/slides/slide5.xml><?xml version="1.0" encoding="utf-8"?>
+<file path=ppt/slides/slide6.xml><?xml version="1.0" encoding="utf-8"?>
+<p:sld xmlns:a="http://schemas.openxmlformats.org/drawingml/2006/main" xmlns:r="http://schemas.openxmlformats.org/officeDocument/2006/relationships" xmlns:p="http://schemas.openxmlformats.org/presentationml/2006/main">
+  <p:cSld>
+    <p:bg>
+      <p:bgPr>
+        <a:solidFill>
+          <a:srgbClr val="4B0082"/>
+        </a:solidFill>
+        <a:effectLst/>
+      </p:bgPr>
+    </p:bg>
+    <p:spTree>
+      <p:nvGrpSpPr>
+        <p:cNvPr id="1" name="Shape 76"/>
+        <p:cNvGrpSpPr/>
+        <p:nvPr/>
+      </p:nvGrpSpPr>
+      <p:grpSpPr>
+        <a:xfrm>
+          <a:off x="0" y="0"/>
+          <a:ext cx="0" cy="0"/>
+          <a:chOff x="0" y="0"/>
+          <a:chExt cx="0" cy="0"/>
+        </a:xfrm>
+      </p:grpSpPr>
+      <p:sp>
+        <p:nvSpPr>
+          <p:cNvPr id="77" name="Google Shape;77;p17"/>
+          <p:cNvSpPr txBox="1">
+            <a:spLocks noGrp="1"/>
+          </p:cNvSpPr>
+          <p:nvPr>
+            <p:ph type="title"/>
+          </p:nvPr>
+        </p:nvSpPr>
+        <p:spPr>
+          <a:xfrm>
+            <a:off x="110836" y="148869"/>
+            <a:ext cx="8908473" cy="945640"/>
+          </a:xfrm>
+          <a:prstGeom prst="rect">
+            <a:avLst/>
+          </a:prstGeom>
+        </p:spPr>
+        <p:txBody>
+          <a:bodyPr spcFirstLastPara="1" wrap="square" lIns="91425" tIns="91425" rIns="91425" bIns="91425" anchor="ctr" anchorCtr="0">
+            <a:noAutofit/>
+          </a:bodyPr>
+          <a:lstStyle/>
+          <a:p>
+            <a:pPr marL="0" lvl="0" indent="0" algn="ctr" rtl="0">
+              <a:spcBef>
+                <a:spcPts val="0"/>
+              </a:spcBef>
+              <a:spcAft>
+                <a:spcPts val="0"/>
+              </a:spcAft>
+              <a:buNone/>
+            </a:pPr>
+            <a:r>
+              <a:rPr lang="en-US" sz="6600" dirty="0">
+                <a:solidFill>
+                  <a:schemeClr val="bg1"/>
+                </a:solidFill>
+              </a:rPr>
+              <a:t>Future</a:t>
+            </a:r>
+            <a:r>
+              <a:rPr lang="en-US" dirty="0">
+                <a:solidFill>
+                  <a:schemeClr val="bg1"/>
+                </a:solidFill>
+              </a:rPr>
+              <a:t> </a:t>
+            </a:r>
+            <a:r>
+              <a:rPr lang="en-US" sz="6600" dirty="0">
+                <a:solidFill>
+                  <a:schemeClr val="bg1"/>
+                </a:solidFill>
+              </a:rPr>
+              <a:t>Development</a:t>
+            </a:r>
+            <a:endParaRPr dirty="0">
+              <a:solidFill>
+                <a:schemeClr val="bg1"/>
+              </a:solidFill>
+            </a:endParaRPr>
+          </a:p>
+        </p:txBody>
+      </p:sp>
+      <p:sp>
+        <p:nvSpPr>
+          <p:cNvPr id="2" name="TextBox 1">
+            <a:extLst>
+              <a:ext uri="{FF2B5EF4-FFF2-40B4-BE49-F238E27FC236}">
+                <a16:creationId xmlns:a16="http://schemas.microsoft.com/office/drawing/2014/main" id="{787465C4-1D21-1763-DF1F-9682E427C4DA}"/>
+              </a:ext>
+            </a:extLst>
+          </p:cNvPr>
+          <p:cNvSpPr txBox="1"/>
+          <p:nvPr/>
+        </p:nvSpPr>
+        <p:spPr>
+          <a:xfrm>
+            <a:off x="727363" y="1302328"/>
+            <a:ext cx="7689273" cy="3046988"/>
+          </a:xfrm>
+          <a:prstGeom prst="rect">
+            <a:avLst/>
+          </a:prstGeom>
+          <a:noFill/>
+        </p:spPr>
+        <p:txBody>
+          <a:bodyPr wrap="square" rtlCol="0">
+            <a:spAutoFit/>
+          </a:bodyPr>
+          <a:lstStyle/>
+          <a:p>
+            <a:pPr algn="ctr">
+              <a:buClr>
+                <a:schemeClr val="bg1"/>
+              </a:buClr>
+            </a:pPr>
+            <a:r>
+              <a:rPr lang="en-US" sz="4800" dirty="0">
+                <a:solidFill>
+                  <a:schemeClr val="bg1"/>
+                </a:solidFill>
+              </a:rPr>
+              <a:t>Movie and Music News</a:t>
+            </a:r>
+          </a:p>
+          <a:p>
+            <a:pPr algn="ctr">
+              <a:buClr>
+                <a:schemeClr val="bg1"/>
+              </a:buClr>
+            </a:pPr>
+            <a:r>
+              <a:rPr lang="en-US" sz="4800" dirty="0">
+                <a:solidFill>
+                  <a:schemeClr val="bg1"/>
+                </a:solidFill>
+              </a:rPr>
+              <a:t>Awards</a:t>
+            </a:r>
+          </a:p>
+          <a:p>
+            <a:pPr algn="ctr">
+              <a:buClr>
+                <a:schemeClr val="bg1"/>
+              </a:buClr>
+            </a:pPr>
+            <a:r>
+              <a:rPr lang="en-AU" sz="4800" dirty="0">
+                <a:solidFill>
+                  <a:schemeClr val="bg1"/>
+                </a:solidFill>
+              </a:rPr>
+              <a:t>Social and Forum</a:t>
+            </a:r>
+          </a:p>
+          <a:p>
+            <a:pPr algn="ctr">
+              <a:buClr>
+                <a:schemeClr val="bg1"/>
+              </a:buClr>
+            </a:pPr>
+            <a:r>
+              <a:rPr lang="en-AU" sz="4800" dirty="0">
+                <a:solidFill>
+                  <a:schemeClr val="bg1"/>
+                </a:solidFill>
+              </a:rPr>
+              <a:t>Login &amp; sign up page</a:t>
+            </a:r>
+            <a:endParaRPr lang="en-US" sz="4800" dirty="0">
+              <a:solidFill>
+                <a:schemeClr val="bg1"/>
+              </a:solidFill>
+            </a:endParaRPr>
+          </a:p>
+        </p:txBody>
+      </p:sp>
+    </p:spTree>
+    <p:extLst>
+      <p:ext uri="{BB962C8B-B14F-4D97-AF65-F5344CB8AC3E}">
+        <p14:creationId xmlns:p14="http://schemas.microsoft.com/office/powerpoint/2010/main" val="4057235823"/>
+      </p:ext>
+    </p:extLst>
+  </p:cSld>
+  <p:clrMapOvr>
+    <a:masterClrMapping/>
+  </p:clrMapOvr>
+</p:sld>
+</file>
+
+<file path=ppt/slides/slide7.xml><?xml version="1.0" encoding="utf-8"?>
 <p:sld xmlns:a="http://schemas.openxmlformats.org/drawingml/2006/main" xmlns:r="http://schemas.openxmlformats.org/officeDocument/2006/relationships" xmlns:p="http://schemas.openxmlformats.org/presentationml/2006/main">
   <p:cSld>
     <p:bg>

</xml_diff>